<commit_message>
PPT commit about tables in database
</commit_message>
<xml_diff>
--- a/To do list.pptx
+++ b/To do list.pptx
@@ -2045,8 +2045,8 @@
       </dsp:nvSpPr>
       <dsp:spPr>
         <a:xfrm>
-          <a:off x="0" y="46563"/>
-          <a:ext cx="4862446" cy="1253070"/>
+          <a:off x="0" y="1653"/>
+          <a:ext cx="4862446" cy="1271205"/>
         </a:xfrm>
         <a:prstGeom prst="roundRect">
           <a:avLst/>
@@ -2088,12 +2088,12 @@
         </a:fontRef>
       </dsp:style>
       <dsp:txBody>
-        <a:bodyPr spcFirstLastPara="0" vert="horz" wrap="square" lIns="194310" tIns="194310" rIns="194310" bIns="194310" numCol="1" spcCol="1270" anchor="ctr" anchorCtr="0">
+        <a:bodyPr spcFirstLastPara="0" vert="horz" wrap="square" lIns="201930" tIns="201930" rIns="201930" bIns="201930" numCol="1" spcCol="1270" anchor="ctr" anchorCtr="0">
           <a:noAutofit/>
         </a:bodyPr>
         <a:lstStyle/>
         <a:p>
-          <a:pPr marL="0" lvl="0" indent="0" algn="l" defTabSz="2266950">
+          <a:pPr marL="0" lvl="0" indent="0" algn="l" defTabSz="2355850">
             <a:lnSpc>
               <a:spcPct val="90000"/>
             </a:lnSpc>
@@ -2106,17 +2106,17 @@
             <a:buNone/>
           </a:pPr>
           <a:r>
-            <a:rPr lang="hu-HU" sz="5100" kern="1200" dirty="0">
+            <a:rPr lang="hu-HU" sz="5300" kern="1200" dirty="0">
               <a:latin typeface="Aptos Display" panose="020F0302020204030204"/>
             </a:rPr>
             <a:t>Követése</a:t>
           </a:r>
-          <a:endParaRPr lang="hu-HU" sz="5100" kern="1200" dirty="0"/>
+          <a:endParaRPr lang="hu-HU" sz="5300" kern="1200" dirty="0"/>
         </a:p>
       </dsp:txBody>
       <dsp:txXfrm>
-        <a:off x="61170" y="107733"/>
-        <a:ext cx="4740106" cy="1130730"/>
+        <a:off x="62055" y="63708"/>
+        <a:ext cx="4738336" cy="1147095"/>
       </dsp:txXfrm>
     </dsp:sp>
     <dsp:sp modelId="{F5F39342-3084-4B0F-940B-14D96FBEACA6}">
@@ -2126,8 +2126,8 @@
       </dsp:nvSpPr>
       <dsp:spPr>
         <a:xfrm>
-          <a:off x="0" y="1446513"/>
-          <a:ext cx="4862446" cy="1253070"/>
+          <a:off x="0" y="1425498"/>
+          <a:ext cx="4862446" cy="1271205"/>
         </a:xfrm>
         <a:prstGeom prst="roundRect">
           <a:avLst/>
@@ -2169,12 +2169,12 @@
         </a:fontRef>
       </dsp:style>
       <dsp:txBody>
-        <a:bodyPr spcFirstLastPara="0" vert="horz" wrap="square" lIns="194310" tIns="194310" rIns="194310" bIns="194310" numCol="1" spcCol="1270" anchor="ctr" anchorCtr="0">
+        <a:bodyPr spcFirstLastPara="0" vert="horz" wrap="square" lIns="201930" tIns="201930" rIns="201930" bIns="201930" numCol="1" spcCol="1270" anchor="ctr" anchorCtr="0">
           <a:noAutofit/>
         </a:bodyPr>
         <a:lstStyle/>
         <a:p>
-          <a:pPr marL="0" lvl="0" indent="0" algn="l" defTabSz="2266950">
+          <a:pPr marL="0" lvl="0" indent="0" algn="l" defTabSz="2355850">
             <a:lnSpc>
               <a:spcPct val="90000"/>
             </a:lnSpc>
@@ -2187,7 +2187,7 @@
             <a:buNone/>
           </a:pPr>
           <a:r>
-            <a:rPr lang="hu-HU" sz="5100" kern="1200" dirty="0">
+            <a:rPr lang="hu-HU" sz="5300" kern="1200" dirty="0">
               <a:latin typeface="Aptos Display" panose="020F0302020204030204"/>
             </a:rPr>
             <a:t>Létrehozása</a:t>
@@ -2195,8 +2195,8 @@
         </a:p>
       </dsp:txBody>
       <dsp:txXfrm>
-        <a:off x="61170" y="1507683"/>
-        <a:ext cx="4740106" cy="1130730"/>
+        <a:off x="62055" y="1487553"/>
+        <a:ext cx="4738336" cy="1147095"/>
       </dsp:txXfrm>
     </dsp:sp>
     <dsp:sp modelId="{4700064B-7D20-4ABD-B7A8-2C55FEE1A221}">
@@ -2206,8 +2206,8 @@
       </dsp:nvSpPr>
       <dsp:spPr>
         <a:xfrm>
-          <a:off x="0" y="2846463"/>
-          <a:ext cx="4862446" cy="1253070"/>
+          <a:off x="0" y="2849343"/>
+          <a:ext cx="4862446" cy="1271205"/>
         </a:xfrm>
         <a:prstGeom prst="roundRect">
           <a:avLst/>
@@ -2249,12 +2249,12 @@
         </a:fontRef>
       </dsp:style>
       <dsp:txBody>
-        <a:bodyPr spcFirstLastPara="0" vert="horz" wrap="square" lIns="194310" tIns="194310" rIns="194310" bIns="194310" numCol="1" spcCol="1270" anchor="ctr" anchorCtr="0">
+        <a:bodyPr spcFirstLastPara="0" vert="horz" wrap="square" lIns="201930" tIns="201930" rIns="201930" bIns="201930" numCol="1" spcCol="1270" anchor="ctr" anchorCtr="0">
           <a:noAutofit/>
         </a:bodyPr>
         <a:lstStyle/>
         <a:p>
-          <a:pPr marL="0" lvl="0" indent="0" algn="l" defTabSz="2266950">
+          <a:pPr marL="0" lvl="0" indent="0" algn="l" defTabSz="2355850">
             <a:lnSpc>
               <a:spcPct val="90000"/>
             </a:lnSpc>
@@ -2267,7 +2267,7 @@
             <a:buNone/>
           </a:pPr>
           <a:r>
-            <a:rPr lang="hu-HU" sz="5100" kern="1200" dirty="0">
+            <a:rPr lang="hu-HU" sz="5300" kern="1200" dirty="0">
               <a:latin typeface="Aptos Display" panose="020F0302020204030204"/>
             </a:rPr>
             <a:t>Törlése</a:t>
@@ -2275,8 +2275,8 @@
         </a:p>
       </dsp:txBody>
       <dsp:txXfrm>
-        <a:off x="61170" y="2907633"/>
-        <a:ext cx="4740106" cy="1130730"/>
+        <a:off x="62055" y="2911398"/>
+        <a:ext cx="4738336" cy="1147095"/>
       </dsp:txXfrm>
     </dsp:sp>
     <dsp:sp modelId="{953EAF13-C9F5-4BA6-88DB-460799A64E95}">
@@ -2286,8 +2286,8 @@
       </dsp:nvSpPr>
       <dsp:spPr>
         <a:xfrm>
-          <a:off x="0" y="4246413"/>
-          <a:ext cx="4862446" cy="1253070"/>
+          <a:off x="0" y="4273188"/>
+          <a:ext cx="4862446" cy="1271205"/>
         </a:xfrm>
         <a:prstGeom prst="roundRect">
           <a:avLst/>
@@ -2329,12 +2329,12 @@
         </a:fontRef>
       </dsp:style>
       <dsp:txBody>
-        <a:bodyPr spcFirstLastPara="0" vert="horz" wrap="square" lIns="194310" tIns="194310" rIns="194310" bIns="194310" numCol="1" spcCol="1270" anchor="ctr" anchorCtr="0">
+        <a:bodyPr spcFirstLastPara="0" vert="horz" wrap="square" lIns="201930" tIns="201930" rIns="201930" bIns="201930" numCol="1" spcCol="1270" anchor="ctr" anchorCtr="0">
           <a:noAutofit/>
         </a:bodyPr>
         <a:lstStyle/>
         <a:p>
-          <a:pPr marL="0" lvl="0" indent="0" algn="l" defTabSz="2266950">
+          <a:pPr marL="0" lvl="0" indent="0" algn="l" defTabSz="2355850">
             <a:lnSpc>
               <a:spcPct val="90000"/>
             </a:lnSpc>
@@ -2347,7 +2347,7 @@
             <a:buNone/>
           </a:pPr>
           <a:r>
-            <a:rPr lang="hu-HU" sz="5100" kern="1200" dirty="0">
+            <a:rPr lang="hu-HU" sz="5300" kern="1200" dirty="0">
               <a:latin typeface="Aptos Display" panose="020F0302020204030204"/>
             </a:rPr>
             <a:t>Frissítése</a:t>
@@ -2355,8 +2355,8 @@
         </a:p>
       </dsp:txBody>
       <dsp:txXfrm>
-        <a:off x="61170" y="4307583"/>
-        <a:ext cx="4740106" cy="1130730"/>
+        <a:off x="62055" y="4335243"/>
+        <a:ext cx="4738336" cy="1147095"/>
       </dsp:txXfrm>
     </dsp:sp>
   </dsp:spTree>
@@ -2378,8 +2378,8 @@
       </dsp:nvSpPr>
       <dsp:spPr>
         <a:xfrm>
-          <a:off x="0" y="508128"/>
-          <a:ext cx="4862446" cy="1400489"/>
+          <a:off x="0" y="402715"/>
+          <a:ext cx="4862446" cy="1463085"/>
         </a:xfrm>
         <a:prstGeom prst="roundRect">
           <a:avLst/>
@@ -2421,12 +2421,12 @@
         </a:fontRef>
       </dsp:style>
       <dsp:txBody>
-        <a:bodyPr spcFirstLastPara="0" vert="horz" wrap="square" lIns="217170" tIns="217170" rIns="217170" bIns="217170" numCol="1" spcCol="1270" anchor="ctr" anchorCtr="0">
+        <a:bodyPr spcFirstLastPara="0" vert="horz" wrap="square" lIns="232410" tIns="232410" rIns="232410" bIns="232410" numCol="1" spcCol="1270" anchor="ctr" anchorCtr="0">
           <a:noAutofit/>
         </a:bodyPr>
         <a:lstStyle/>
         <a:p>
-          <a:pPr marL="0" lvl="0" indent="0" algn="l" defTabSz="2533650">
+          <a:pPr marL="0" lvl="0" indent="0" algn="l" defTabSz="2711450">
             <a:lnSpc>
               <a:spcPct val="90000"/>
             </a:lnSpc>
@@ -2439,15 +2439,15 @@
             <a:buNone/>
           </a:pPr>
           <a:r>
-            <a:rPr lang="hu-HU" sz="5700" kern="1200"/>
+            <a:rPr lang="hu-HU" sz="6100" kern="1200"/>
             <a:t>Login</a:t>
           </a:r>
-          <a:endParaRPr lang="en-US" sz="5700" kern="1200"/>
+          <a:endParaRPr lang="en-US" sz="6100" kern="1200"/>
         </a:p>
       </dsp:txBody>
       <dsp:txXfrm>
-        <a:off x="68366" y="576494"/>
-        <a:ext cx="4725714" cy="1263757"/>
+        <a:off x="71422" y="474137"/>
+        <a:ext cx="4719602" cy="1320241"/>
       </dsp:txXfrm>
     </dsp:sp>
     <dsp:sp modelId="{4D08B059-026A-4DDF-BBD1-989C40006864}">
@@ -2457,8 +2457,8 @@
       </dsp:nvSpPr>
       <dsp:spPr>
         <a:xfrm>
-          <a:off x="0" y="2072778"/>
-          <a:ext cx="4862446" cy="1400489"/>
+          <a:off x="0" y="2041481"/>
+          <a:ext cx="4862446" cy="1463085"/>
         </a:xfrm>
         <a:prstGeom prst="roundRect">
           <a:avLst/>
@@ -2500,12 +2500,12 @@
         </a:fontRef>
       </dsp:style>
       <dsp:txBody>
-        <a:bodyPr spcFirstLastPara="0" vert="horz" wrap="square" lIns="217170" tIns="217170" rIns="217170" bIns="217170" numCol="1" spcCol="1270" anchor="ctr" anchorCtr="0">
+        <a:bodyPr spcFirstLastPara="0" vert="horz" wrap="square" lIns="232410" tIns="232410" rIns="232410" bIns="232410" numCol="1" spcCol="1270" anchor="ctr" anchorCtr="0">
           <a:noAutofit/>
         </a:bodyPr>
         <a:lstStyle/>
         <a:p>
-          <a:pPr marL="0" lvl="0" indent="0" algn="l" defTabSz="2533650">
+          <a:pPr marL="0" lvl="0" indent="0" algn="l" defTabSz="2711450">
             <a:lnSpc>
               <a:spcPct val="90000"/>
             </a:lnSpc>
@@ -2518,15 +2518,15 @@
             <a:buNone/>
           </a:pPr>
           <a:r>
-            <a:rPr lang="hu-HU" sz="5700" kern="1200"/>
+            <a:rPr lang="hu-HU" sz="6100" kern="1200"/>
             <a:t>Címkék</a:t>
           </a:r>
-          <a:endParaRPr lang="en-US" sz="5700" kern="1200"/>
+          <a:endParaRPr lang="en-US" sz="6100" kern="1200"/>
         </a:p>
       </dsp:txBody>
       <dsp:txXfrm>
-        <a:off x="68366" y="2141144"/>
-        <a:ext cx="4725714" cy="1263757"/>
+        <a:off x="71422" y="2112903"/>
+        <a:ext cx="4719602" cy="1320241"/>
       </dsp:txXfrm>
     </dsp:sp>
     <dsp:sp modelId="{18EBBBC8-CD3E-4ECF-909F-DD9DDE51A938}">
@@ -2536,8 +2536,8 @@
       </dsp:nvSpPr>
       <dsp:spPr>
         <a:xfrm>
-          <a:off x="0" y="3637428"/>
-          <a:ext cx="4862446" cy="1400489"/>
+          <a:off x="0" y="3680246"/>
+          <a:ext cx="4862446" cy="1463085"/>
         </a:xfrm>
         <a:prstGeom prst="roundRect">
           <a:avLst/>
@@ -2579,12 +2579,12 @@
         </a:fontRef>
       </dsp:style>
       <dsp:txBody>
-        <a:bodyPr spcFirstLastPara="0" vert="horz" wrap="square" lIns="217170" tIns="217170" rIns="217170" bIns="217170" numCol="1" spcCol="1270" anchor="ctr" anchorCtr="0">
+        <a:bodyPr spcFirstLastPara="0" vert="horz" wrap="square" lIns="232410" tIns="232410" rIns="232410" bIns="232410" numCol="1" spcCol="1270" anchor="ctr" anchorCtr="0">
           <a:noAutofit/>
         </a:bodyPr>
         <a:lstStyle/>
         <a:p>
-          <a:pPr marL="0" lvl="0" indent="0" algn="l" defTabSz="2533650">
+          <a:pPr marL="0" lvl="0" indent="0" algn="l" defTabSz="2711450">
             <a:lnSpc>
               <a:spcPct val="90000"/>
             </a:lnSpc>
@@ -2597,15 +2597,15 @@
             <a:buNone/>
           </a:pPr>
           <a:r>
-            <a:rPr lang="hu-HU" sz="5700" kern="1200"/>
+            <a:rPr lang="hu-HU" sz="6100" kern="1200"/>
             <a:t>Emlékeztetők</a:t>
           </a:r>
-          <a:endParaRPr lang="en-US" sz="5700" kern="1200"/>
+          <a:endParaRPr lang="en-US" sz="6100" kern="1200"/>
         </a:p>
       </dsp:txBody>
       <dsp:txXfrm>
-        <a:off x="68366" y="3705794"/>
-        <a:ext cx="4725714" cy="1263757"/>
+        <a:off x="71422" y="3751668"/>
+        <a:ext cx="4719602" cy="1320241"/>
       </dsp:txXfrm>
     </dsp:sp>
   </dsp:spTree>
@@ -9095,10 +9095,10 @@
       </p:sp>
       <p:pic>
         <p:nvPicPr>
-          <p:cNvPr id="6" name="Kép 5">
+          <p:cNvPr id="3" name="Kép 2">
             <a:extLst>
               <a:ext uri="{FF2B5EF4-FFF2-40B4-BE49-F238E27FC236}">
-                <a16:creationId xmlns:a16="http://schemas.microsoft.com/office/drawing/2014/main" id="{3866E145-843D-462E-90EB-6DCF128FAE01}"/>
+                <a16:creationId xmlns:a16="http://schemas.microsoft.com/office/drawing/2014/main" id="{BC3D6A62-C6A3-4461-AB59-E158D75F590C}"/>
               </a:ext>
             </a:extLst>
           </p:cNvPr>
@@ -9115,8 +9115,8 @@
         </p:blipFill>
         <p:spPr>
           <a:xfrm>
-            <a:off x="4601043" y="1197484"/>
-            <a:ext cx="7335274" cy="4096322"/>
+            <a:off x="4302426" y="1173668"/>
+            <a:ext cx="7418815" cy="4325984"/>
           </a:xfrm>
           <a:prstGeom prst="rect">
             <a:avLst/>
@@ -13323,7 +13323,7 @@
         </p:nvSpPr>
         <p:spPr>
           <a:xfrm>
-            <a:off x="303141" y="4745317"/>
+            <a:off x="303141" y="4758569"/>
             <a:ext cx="5227958" cy="1375145"/>
           </a:xfrm>
         </p:spPr>
@@ -13378,7 +13378,29 @@
                 <a:ea typeface="+mn-ea"/>
                 <a:cs typeface="+mn-cs"/>
               </a:rPr>
-              <a:t>, t_name, description, user_id*, label_id*, priority, progresson)</a:t>
+              <a:t>, t_name, description, user_id*, label_id*, priority, progresson</a:t>
+            </a:r>
+            <a:r>
+              <a:rPr lang="hu-HU" sz="2400" kern="1200" noProof="1">
+                <a:solidFill>
+                  <a:srgbClr val="FFFFFF"/>
+                </a:solidFill>
+                <a:latin typeface="+mn-lt"/>
+                <a:ea typeface="+mn-ea"/>
+                <a:cs typeface="+mn-cs"/>
+              </a:rPr>
+              <a:t>,deadline</a:t>
+            </a:r>
+            <a:r>
+              <a:rPr lang="en-US" sz="2400" kern="1200" noProof="1">
+                <a:solidFill>
+                  <a:srgbClr val="FFFFFF"/>
+                </a:solidFill>
+                <a:latin typeface="+mn-lt"/>
+                <a:ea typeface="+mn-ea"/>
+                <a:cs typeface="+mn-cs"/>
+              </a:rPr>
+              <a:t>)</a:t>
             </a:r>
             <a:endParaRPr lang="en-US" sz="2400" kern="1200" noProof="1">
               <a:solidFill>
@@ -13391,10 +13413,10 @@
       </p:sp>
       <p:pic>
         <p:nvPicPr>
-          <p:cNvPr id="4" name="Picture 3" descr="A screenshot of a computer&#10;&#10;Description automatically generated">
+          <p:cNvPr id="5" name="Kép 4">
             <a:extLst>
               <a:ext uri="{FF2B5EF4-FFF2-40B4-BE49-F238E27FC236}">
-                <a16:creationId xmlns:a16="http://schemas.microsoft.com/office/drawing/2014/main" id="{1D89D1BA-AF46-A02D-37DF-647B2DC0B0C7}"/>
+                <a16:creationId xmlns:a16="http://schemas.microsoft.com/office/drawing/2014/main" id="{2BCA4660-FCA7-4AFB-A274-B49081717EAF}"/>
               </a:ext>
             </a:extLst>
           </p:cNvPr>
@@ -13411,8 +13433,8 @@
         </p:blipFill>
         <p:spPr>
           <a:xfrm>
-            <a:off x="6096000" y="485775"/>
-            <a:ext cx="5608320" cy="5841999"/>
+            <a:off x="6611797" y="578343"/>
+            <a:ext cx="4826357" cy="5701313"/>
           </a:xfrm>
           <a:prstGeom prst="rect">
             <a:avLst/>

</xml_diff>